<commit_message>
Update images and presentation
</commit_message>
<xml_diff>
--- a/Architektur/Architektur_GIT.pptx
+++ b/Architektur/Architektur_GIT.pptx
@@ -1028,12 +1028,8 @@
           </a:p>
           <a:p>
             <a:r>
-              <a:rPr lang="en-US"/>
-              <a:t>Tags: </a:t>
-            </a:r>
-            <a:r>
               <a:rPr lang="en-US" dirty="0"/>
-              <a:t>Tags, Remote-HEAD, Remote-Branches, Local-HEAD, Local-Branches</a:t>
+              <a:t>Tags: Tags, Remote-HEAD, Remote-Branches, Local-HEAD, Local-Branches</a:t>
             </a:r>
           </a:p>
           <a:p>
@@ -1101,6 +1097,91 @@
     <p:extLst>
       <p:ext uri="{BB962C8B-B14F-4D97-AF65-F5344CB8AC3E}">
         <p14:creationId xmlns:p14="http://schemas.microsoft.com/office/powerpoint/2010/main" val="1899401583"/>
+      </p:ext>
+    </p:extLst>
+  </p:cSld>
+  <p:clrMapOvr>
+    <a:masterClrMapping/>
+  </p:clrMapOvr>
+</p:notes>
+</file>
+
+<file path=ppt/notesSlides/notesSlide3.xml><?xml version="1.0" encoding="utf-8"?>
+<p:notes xmlns:a="http://schemas.openxmlformats.org/drawingml/2006/main" xmlns:r="http://schemas.openxmlformats.org/officeDocument/2006/relationships" xmlns:p="http://schemas.openxmlformats.org/presentationml/2006/main">
+  <p:cSld>
+    <p:spTree>
+      <p:nvGrpSpPr>
+        <p:cNvPr id="1" name=""/>
+        <p:cNvGrpSpPr/>
+        <p:nvPr/>
+      </p:nvGrpSpPr>
+      <p:grpSpPr>
+        <a:xfrm>
+          <a:off x="0" y="0"/>
+          <a:ext cx="0" cy="0"/>
+          <a:chOff x="0" y="0"/>
+          <a:chExt cx="0" cy="0"/>
+        </a:xfrm>
+      </p:grpSpPr>
+      <p:sp>
+        <p:nvSpPr>
+          <p:cNvPr id="2" name="Slide Image Placeholder 1"/>
+          <p:cNvSpPr>
+            <a:spLocks noGrp="1" noRot="1" noChangeAspect="1"/>
+          </p:cNvSpPr>
+          <p:nvPr>
+            <p:ph type="sldImg"/>
+          </p:nvPr>
+        </p:nvSpPr>
+        <p:spPr/>
+      </p:sp>
+      <p:sp>
+        <p:nvSpPr>
+          <p:cNvPr id="3" name="Notes Placeholder 2"/>
+          <p:cNvSpPr>
+            <a:spLocks noGrp="1"/>
+          </p:cNvSpPr>
+          <p:nvPr>
+            <p:ph type="body" idx="1"/>
+          </p:nvPr>
+        </p:nvSpPr>
+        <p:spPr/>
+        <p:txBody>
+          <a:bodyPr/>
+          <a:lstStyle/>
+          <a:p>
+            <a:endParaRPr lang="LID4096" dirty="0"/>
+          </a:p>
+        </p:txBody>
+      </p:sp>
+      <p:sp>
+        <p:nvSpPr>
+          <p:cNvPr id="4" name="Slide Number Placeholder 3"/>
+          <p:cNvSpPr>
+            <a:spLocks noGrp="1"/>
+          </p:cNvSpPr>
+          <p:nvPr>
+            <p:ph type="sldNum" sz="quarter" idx="5"/>
+          </p:nvPr>
+        </p:nvSpPr>
+        <p:spPr/>
+        <p:txBody>
+          <a:bodyPr/>
+          <a:lstStyle/>
+          <a:p>
+            <a:fld id="{92C84FA6-9D13-4F89-9D5F-507040849F9F}" type="slidenum">
+              <a:rPr lang="de-DE" altLang="de-DE" smtClean="0"/>
+              <a:pPr/>
+              <a:t>17</a:t>
+            </a:fld>
+            <a:endParaRPr lang="de-DE" altLang="de-DE"/>
+          </a:p>
+        </p:txBody>
+      </p:sp>
+    </p:spTree>
+    <p:extLst>
+      <p:ext uri="{BB962C8B-B14F-4D97-AF65-F5344CB8AC3E}">
+        <p14:creationId xmlns:p14="http://schemas.microsoft.com/office/powerpoint/2010/main" val="861361742"/>
       </p:ext>
     </p:extLst>
   </p:cSld>
@@ -3363,10 +3444,10 @@
       </p:sp>
       <p:pic>
         <p:nvPicPr>
-          <p:cNvPr id="18" name="Content Placeholder 17">
+          <p:cNvPr id="21" name="Content Placeholder 20">
             <a:extLst>
               <a:ext uri="{FF2B5EF4-FFF2-40B4-BE49-F238E27FC236}">
-                <a16:creationId xmlns:a16="http://schemas.microsoft.com/office/drawing/2014/main" id="{6A4D7333-3BF2-4D66-87D2-E88CD3CD6566}"/>
+                <a16:creationId xmlns:a16="http://schemas.microsoft.com/office/drawing/2014/main" id="{28D07755-87D5-4013-8382-FBF77D6F8496}"/>
               </a:ext>
             </a:extLst>
           </p:cNvPr>
@@ -3385,13 +3466,13 @@
               </a:ext>
             </a:extLst>
           </a:blip>
-          <a:srcRect l="630" r="2101"/>
+          <a:srcRect l="3511" t="5471" r="6504" b="11054"/>
           <a:stretch/>
         </p:blipFill>
         <p:spPr>
           <a:xfrm>
-            <a:off x="1010435" y="1662783"/>
-            <a:ext cx="10691886" cy="3532434"/>
+            <a:off x="1183214" y="1808820"/>
+            <a:ext cx="10538411" cy="3495668"/>
           </a:xfrm>
         </p:spPr>
       </p:pic>
@@ -7409,10 +7490,10 @@
       </p:sp>
       <p:pic>
         <p:nvPicPr>
-          <p:cNvPr id="13" name="Grafik 12">
+          <p:cNvPr id="17" name="Picture 16">
             <a:extLst>
               <a:ext uri="{FF2B5EF4-FFF2-40B4-BE49-F238E27FC236}">
-                <a16:creationId xmlns:a16="http://schemas.microsoft.com/office/drawing/2014/main" id="{76CACC09-E94D-474A-A0E9-4D9E9156779A}"/>
+                <a16:creationId xmlns:a16="http://schemas.microsoft.com/office/drawing/2014/main" id="{E8219970-0CF1-4CD2-8E76-F00721D76842}"/>
               </a:ext>
             </a:extLst>
           </p:cNvPr>
@@ -7422,65 +7503,27 @@
           <p:nvPr/>
         </p:nvPicPr>
         <p:blipFill>
-          <a:blip r:embed="rId2"/>
+          <a:blip r:embed="rId2">
+            <a:extLst>
+              <a:ext uri="{28A0092B-C50C-407E-A947-70E740481C1C}">
+                <a14:useLocalDpi xmlns:a14="http://schemas.microsoft.com/office/drawing/2010/main" val="0"/>
+              </a:ext>
+            </a:extLst>
+          </a:blip>
           <a:stretch>
             <a:fillRect/>
           </a:stretch>
         </p:blipFill>
         <p:spPr>
           <a:xfrm>
-            <a:off x="3620725" y="953725"/>
-            <a:ext cx="4617322" cy="4617322"/>
+            <a:off x="3186883" y="1571447"/>
+            <a:ext cx="5945234" cy="3715106"/>
           </a:xfrm>
           <a:prstGeom prst="rect">
             <a:avLst/>
           </a:prstGeom>
         </p:spPr>
       </p:pic>
-      <p:sp>
-        <p:nvSpPr>
-          <p:cNvPr id="14" name="Textfeld 13">
-            <a:extLst>
-              <a:ext uri="{FF2B5EF4-FFF2-40B4-BE49-F238E27FC236}">
-                <a16:creationId xmlns:a16="http://schemas.microsoft.com/office/drawing/2014/main" id="{E978F630-C141-423E-878A-D2C3B043B8FB}"/>
-              </a:ext>
-            </a:extLst>
-          </p:cNvPr>
-          <p:cNvSpPr txBox="1"/>
-          <p:nvPr/>
-        </p:nvSpPr>
-        <p:spPr>
-          <a:xfrm>
-            <a:off x="10956540" y="5769260"/>
-            <a:ext cx="1132041" cy="215444"/>
-          </a:xfrm>
-          <a:prstGeom prst="rect">
-            <a:avLst/>
-          </a:prstGeom>
-          <a:noFill/>
-        </p:spPr>
-        <p:txBody>
-          <a:bodyPr wrap="none" rtlCol="0">
-            <a:spAutoFit/>
-          </a:bodyPr>
-          <a:lstStyle/>
-          <a:p>
-            <a:pPr algn="l"/>
-            <a:r>
-              <a:rPr lang="de-DE" sz="800" dirty="0"/>
-              <a:t>[</a:t>
-            </a:r>
-            <a:r>
-              <a:rPr lang="de-DE" sz="800" dirty="0" err="1"/>
-              <a:t>AbbX</a:t>
-            </a:r>
-            <a:r>
-              <a:rPr lang="de-DE" sz="800" dirty="0"/>
-              <a:t>, pixabay.com]</a:t>
-            </a:r>
-          </a:p>
-        </p:txBody>
-      </p:sp>
     </p:spTree>
     <p:extLst>
       <p:ext uri="{BB962C8B-B14F-4D97-AF65-F5344CB8AC3E}">
@@ -9244,7 +9287,7 @@
                     <a:p>
                       <a:r>
                         <a:rPr lang="de-DE" sz="1600" dirty="0">
-                          <a:hlinkClick r:id="rId2"/>
+                          <a:hlinkClick r:id="rId3"/>
                         </a:rPr>
                         <a:t>https://medium.com/@willhayjr/the-architecture-and-history-of-git-a-distributed-version-control-system-62b17dd37742</a:t>
                       </a:r>
@@ -16574,10 +16617,10 @@
       </p:sp>
       <p:pic>
         <p:nvPicPr>
-          <p:cNvPr id="15" name="Content Placeholder 13">
+          <p:cNvPr id="21" name="Picture 20">
             <a:extLst>
               <a:ext uri="{FF2B5EF4-FFF2-40B4-BE49-F238E27FC236}">
-                <a16:creationId xmlns:a16="http://schemas.microsoft.com/office/drawing/2014/main" id="{AED78267-E79B-4459-BD7C-5408E9E9C4E6}"/>
+                <a16:creationId xmlns:a16="http://schemas.microsoft.com/office/drawing/2014/main" id="{E24400A2-67B5-4296-8802-D2D8573246D1}"/>
               </a:ext>
             </a:extLst>
           </p:cNvPr>
@@ -16594,84 +16637,52 @@
               </a:ext>
             </a:extLst>
           </a:blip>
-          <a:srcRect l="10575" t="7518" r="11879" b="7413"/>
+          <a:srcRect l="4448" t="4661" r="4357" b="3804"/>
           <a:stretch/>
         </p:blipFill>
-        <p:spPr bwMode="auto">
+        <p:spPr>
           <a:xfrm>
-            <a:off x="7131115" y="1123516"/>
-            <a:ext cx="4410491" cy="4610967"/>
+            <a:off x="1100445" y="1088740"/>
+            <a:ext cx="5535606" cy="4725525"/>
           </a:xfrm>
           <a:prstGeom prst="rect">
             <a:avLst/>
           </a:prstGeom>
-          <a:noFill/>
-          <a:ln>
-            <a:noFill/>
-          </a:ln>
-          <a:effectLst/>
-          <a:extLst>
-            <a:ext uri="{909E8E84-426E-40DD-AFC4-6F175D3DCCD1}">
-              <a14:hiddenFill xmlns:a14="http://schemas.microsoft.com/office/drawing/2010/main">
-                <a:solidFill>
-                  <a:schemeClr val="accent1"/>
-                </a:solidFill>
-              </a14:hiddenFill>
-            </a:ext>
-            <a:ext uri="{91240B29-F687-4F45-9708-019B960494DF}">
-              <a14:hiddenLine xmlns:a14="http://schemas.microsoft.com/office/drawing/2010/main" w="9525">
-                <a:solidFill>
-                  <a:schemeClr val="tx1"/>
-                </a:solidFill>
-                <a:miter lim="800000"/>
-                <a:headEnd/>
-                <a:tailEnd/>
-              </a14:hiddenLine>
-            </a:ext>
-            <a:ext uri="{AF507438-7753-43E0-B8FC-AC1667EBCBE1}">
-              <a14:hiddenEffects xmlns:a14="http://schemas.microsoft.com/office/drawing/2010/main">
-                <a:effectLst>
-                  <a:outerShdw dist="35921" dir="2700000" algn="ctr" rotWithShape="0">
-                    <a:schemeClr val="bg2"/>
-                  </a:outerShdw>
-                </a:effectLst>
-              </a14:hiddenEffects>
-            </a:ext>
-          </a:extLst>
         </p:spPr>
       </p:pic>
       <p:pic>
         <p:nvPicPr>
-          <p:cNvPr id="18" name="Content Placeholder 17">
+          <p:cNvPr id="23" name="Picture 22">
             <a:extLst>
               <a:ext uri="{FF2B5EF4-FFF2-40B4-BE49-F238E27FC236}">
-                <a16:creationId xmlns:a16="http://schemas.microsoft.com/office/drawing/2014/main" id="{D5AB1C4C-647E-4E13-863F-1B6255FAD189}"/>
+                <a16:creationId xmlns:a16="http://schemas.microsoft.com/office/drawing/2014/main" id="{C200ECA4-81A7-4DEC-A5B3-C008A75EE357}"/>
               </a:ext>
             </a:extLst>
           </p:cNvPr>
           <p:cNvPicPr>
-            <a:picLocks noGrp="1" noChangeAspect="1"/>
+            <a:picLocks noChangeAspect="1"/>
           </p:cNvPicPr>
-          <p:nvPr>
-            <p:ph idx="1"/>
-          </p:nvPr>
+          <p:nvPr/>
         </p:nvPicPr>
         <p:blipFill rotWithShape="1">
-          <a:blip r:embed="rId4" cstate="print">
+          <a:blip r:embed="rId4">
             <a:extLst>
               <a:ext uri="{28A0092B-C50C-407E-A947-70E740481C1C}">
                 <a14:useLocalDpi xmlns:a14="http://schemas.microsoft.com/office/drawing/2010/main" val="0"/>
               </a:ext>
             </a:extLst>
           </a:blip>
-          <a:srcRect l="3141" t="1954" r="2619" b="2646"/>
+          <a:srcRect l="3540" t="6295" r="3261" b="4736"/>
           <a:stretch/>
         </p:blipFill>
         <p:spPr>
           <a:xfrm>
-            <a:off x="1010415" y="1263951"/>
-            <a:ext cx="5490602" cy="4628383"/>
+            <a:off x="6996100" y="1178750"/>
+            <a:ext cx="4365485" cy="4531502"/>
           </a:xfrm>
+          <a:prstGeom prst="rect">
+            <a:avLst/>
+          </a:prstGeom>
         </p:spPr>
       </p:pic>
     </p:spTree>

</xml_diff>